<commit_message>
Add project part 2 sequential group recommendation methods and presentation
</commit_message>
<xml_diff>
--- a/presentation/Part2_group.pptx
+++ b/presentation/Part2_group.pptx
@@ -3811,7 +3811,7 @@
         </p:blipFill>
         <p:spPr>
           <a:xfrm>
-            <a:off x="0" y="0"/>
+            <a:off x="0" y="279698"/>
             <a:ext cx="12192000" cy="6858000"/>
           </a:xfrm>
           <a:prstGeom prst="rect">
@@ -3838,7 +3838,7 @@
         <p:spPr>
           <a:xfrm>
             <a:off x="641956" y="744072"/>
-            <a:ext cx="6628917" cy="2387600"/>
+            <a:ext cx="10908088" cy="1001712"/>
           </a:xfrm>
         </p:spPr>
         <p:txBody>
@@ -3849,15 +3849,8 @@
           <a:p>
             <a:pPr algn="l"/>
             <a:r>
-              <a:rPr lang="en-GB" sz="4800" dirty="0"/>
-              <a:t>SDAA Sequential </a:t>
-            </a:r>
-            <a:br>
-              <a:rPr lang="en-GB" sz="4800" dirty="0"/>
-            </a:br>
-            <a:r>
-              <a:rPr lang="en-GB" sz="4800" dirty="0"/>
-              <a:t>Group Recommendations</a:t>
+              <a:rPr lang="en-GB" sz="4400" dirty="0"/>
+              <a:t>SDAA Sequential Group Recommendations</a:t>
             </a:r>
           </a:p>
         </p:txBody>
@@ -3880,7 +3873,7 @@
         </p:nvSpPr>
         <p:spPr>
           <a:xfrm>
-            <a:off x="386774" y="3785722"/>
+            <a:off x="526870" y="3898064"/>
             <a:ext cx="7481452" cy="1655762"/>
           </a:xfrm>
         </p:spPr>
@@ -3956,14 +3949,50 @@
         </p:blipFill>
         <p:spPr>
           <a:xfrm>
-            <a:off x="7613044" y="1863444"/>
-            <a:ext cx="3937000" cy="3695700"/>
+            <a:off x="8008322" y="2900167"/>
+            <a:ext cx="3284453" cy="3083148"/>
           </a:xfrm>
           <a:prstGeom prst="rect">
             <a:avLst/>
           </a:prstGeom>
         </p:spPr>
       </p:pic>
+      <p:sp>
+        <p:nvSpPr>
+          <p:cNvPr id="4" name="TextBox 3">
+            <a:extLst>
+              <a:ext uri="{FF2B5EF4-FFF2-40B4-BE49-F238E27FC236}">
+                <a16:creationId xmlns:a16="http://schemas.microsoft.com/office/drawing/2014/main" id="{109EBB0B-067B-107C-113E-E5BB20EC345F}"/>
+              </a:ext>
+            </a:extLst>
+          </p:cNvPr>
+          <p:cNvSpPr txBox="1"/>
+          <p:nvPr/>
+        </p:nvSpPr>
+        <p:spPr>
+          <a:xfrm>
+            <a:off x="641956" y="1852527"/>
+            <a:ext cx="7146187" cy="461665"/>
+          </a:xfrm>
+          <a:prstGeom prst="rect">
+            <a:avLst/>
+          </a:prstGeom>
+          <a:noFill/>
+        </p:spPr>
+        <p:txBody>
+          <a:bodyPr wrap="none" rtlCol="0">
+            <a:spAutoFit/>
+          </a:bodyPr>
+          <a:lstStyle/>
+          <a:p>
+            <a:r>
+              <a:rPr lang="en-GB" sz="2400" b="1" dirty="0"/>
+              <a:t>Satisfaction and Disagreement Aware Aggregation</a:t>
+            </a:r>
+            <a:endParaRPr lang="en-FI" sz="2400" dirty="0"/>
+          </a:p>
+        </p:txBody>
+      </p:sp>
     </p:spTree>
     <p:extLst>
       <p:ext uri="{BB962C8B-B14F-4D97-AF65-F5344CB8AC3E}">

</xml_diff>